<commit_message>
Changement nom projet et discussion
</commit_message>
<xml_diff>
--- a/Affiche/Affiche.pptx
+++ b/Affiche/Affiche.pptx
@@ -289,7 +289,7 @@
             <a:fld id="{FC4BB252-A889-4523-89F5-C20149F76FCC}" type="datetimeFigureOut">
               <a:rPr lang="fr-FR" smtClean="0"/>
               <a:pPr/>
-              <a:t>27/03/2014</a:t>
+              <a:t>28/03/2014</a:t>
             </a:fld>
             <a:endParaRPr lang="fr-FR"/>
           </a:p>
@@ -456,7 +456,7 @@
             <a:fld id="{FC4BB252-A889-4523-89F5-C20149F76FCC}" type="datetimeFigureOut">
               <a:rPr lang="fr-FR" smtClean="0"/>
               <a:pPr/>
-              <a:t>27/03/2014</a:t>
+              <a:t>28/03/2014</a:t>
             </a:fld>
             <a:endParaRPr lang="fr-FR"/>
           </a:p>
@@ -633,7 +633,7 @@
             <a:fld id="{FC4BB252-A889-4523-89F5-C20149F76FCC}" type="datetimeFigureOut">
               <a:rPr lang="fr-FR" smtClean="0"/>
               <a:pPr/>
-              <a:t>27/03/2014</a:t>
+              <a:t>28/03/2014</a:t>
             </a:fld>
             <a:endParaRPr lang="fr-FR"/>
           </a:p>
@@ -800,7 +800,7 @@
             <a:fld id="{FC4BB252-A889-4523-89F5-C20149F76FCC}" type="datetimeFigureOut">
               <a:rPr lang="fr-FR" smtClean="0"/>
               <a:pPr/>
-              <a:t>27/03/2014</a:t>
+              <a:t>28/03/2014</a:t>
             </a:fld>
             <a:endParaRPr lang="fr-FR"/>
           </a:p>
@@ -1043,7 +1043,7 @@
             <a:fld id="{FC4BB252-A889-4523-89F5-C20149F76FCC}" type="datetimeFigureOut">
               <a:rPr lang="fr-FR" smtClean="0"/>
               <a:pPr/>
-              <a:t>27/03/2014</a:t>
+              <a:t>28/03/2014</a:t>
             </a:fld>
             <a:endParaRPr lang="fr-FR"/>
           </a:p>
@@ -1328,7 +1328,7 @@
             <a:fld id="{FC4BB252-A889-4523-89F5-C20149F76FCC}" type="datetimeFigureOut">
               <a:rPr lang="fr-FR" smtClean="0"/>
               <a:pPr/>
-              <a:t>27/03/2014</a:t>
+              <a:t>28/03/2014</a:t>
             </a:fld>
             <a:endParaRPr lang="fr-FR"/>
           </a:p>
@@ -1752,7 +1752,7 @@
             <a:fld id="{FC4BB252-A889-4523-89F5-C20149F76FCC}" type="datetimeFigureOut">
               <a:rPr lang="fr-FR" smtClean="0"/>
               <a:pPr/>
-              <a:t>27/03/2014</a:t>
+              <a:t>28/03/2014</a:t>
             </a:fld>
             <a:endParaRPr lang="fr-FR"/>
           </a:p>
@@ -1867,7 +1867,7 @@
             <a:fld id="{FC4BB252-A889-4523-89F5-C20149F76FCC}" type="datetimeFigureOut">
               <a:rPr lang="fr-FR" smtClean="0"/>
               <a:pPr/>
-              <a:t>27/03/2014</a:t>
+              <a:t>28/03/2014</a:t>
             </a:fld>
             <a:endParaRPr lang="fr-FR"/>
           </a:p>
@@ -1959,7 +1959,7 @@
             <a:fld id="{FC4BB252-A889-4523-89F5-C20149F76FCC}" type="datetimeFigureOut">
               <a:rPr lang="fr-FR" smtClean="0"/>
               <a:pPr/>
-              <a:t>27/03/2014</a:t>
+              <a:t>28/03/2014</a:t>
             </a:fld>
             <a:endParaRPr lang="fr-FR"/>
           </a:p>
@@ -2233,7 +2233,7 @@
             <a:fld id="{FC4BB252-A889-4523-89F5-C20149F76FCC}" type="datetimeFigureOut">
               <a:rPr lang="fr-FR" smtClean="0"/>
               <a:pPr/>
-              <a:t>27/03/2014</a:t>
+              <a:t>28/03/2014</a:t>
             </a:fld>
             <a:endParaRPr lang="fr-FR"/>
           </a:p>
@@ -2483,7 +2483,7 @@
             <a:fld id="{FC4BB252-A889-4523-89F5-C20149F76FCC}" type="datetimeFigureOut">
               <a:rPr lang="fr-FR" smtClean="0"/>
               <a:pPr/>
-              <a:t>27/03/2014</a:t>
+              <a:t>28/03/2014</a:t>
             </a:fld>
             <a:endParaRPr lang="fr-FR"/>
           </a:p>
@@ -2693,7 +2693,7 @@
             <a:fld id="{FC4BB252-A889-4523-89F5-C20149F76FCC}" type="datetimeFigureOut">
               <a:rPr lang="fr-FR" smtClean="0"/>
               <a:pPr/>
-              <a:t>27/03/2014</a:t>
+              <a:t>28/03/2014</a:t>
             </a:fld>
             <a:endParaRPr lang="fr-FR"/>
           </a:p>
@@ -3236,7 +3236,7 @@
           <a:p>
             <a:pPr algn="ctr"/>
             <a:r>
-              <a:rPr lang="fr-FR" sz="3600" b="1" cap="small" dirty="0" smtClean="0">
+              <a:rPr lang="fr-FR" sz="3600" b="1" cap="small" smtClean="0">
                 <a:solidFill>
                   <a:schemeClr val="accent2"/>
                 </a:solidFill>
@@ -3249,11 +3249,8 @@
                 </a:effectLst>
                 <a:latin typeface="Agency FB" pitchFamily="34" charset="0"/>
               </a:rPr>
-              <a:t>Automatisation des emplois du temps </a:t>
-            </a:r>
-          </a:p>
-          <a:p>
-            <a:pPr algn="ctr"/>
+              <a:t>Résolution approchée </a:t>
+            </a:r>
             <a:r>
               <a:rPr lang="fr-FR" sz="3600" b="1" cap="small" dirty="0" smtClean="0">
                 <a:solidFill>
@@ -3268,10 +3265,10 @@
                 </a:effectLst>
                 <a:latin typeface="Agency FB" pitchFamily="34" charset="0"/>
               </a:rPr>
-              <a:t>de l’ESME </a:t>
-            </a:r>
-            <a:r>
-              <a:rPr lang="fr-FR" sz="3600" b="1" cap="small" dirty="0" err="1" smtClean="0">
+              <a:t>du </a:t>
+            </a:r>
+            <a:r>
+              <a:rPr lang="fr-FR" sz="3600" b="1" cap="small" smtClean="0">
                 <a:solidFill>
                   <a:schemeClr val="accent2"/>
                 </a:solidFill>
@@ -3284,9 +3281,9 @@
                 </a:effectLst>
                 <a:latin typeface="Agency FB" pitchFamily="34" charset="0"/>
               </a:rPr>
-              <a:t>Sudria</a:t>
-            </a:r>
-            <a:endParaRPr lang="fr-FR" sz="3600" b="1" cap="small" dirty="0">
+              <a:t>problème d’ordonnancement</a:t>
+            </a:r>
+            <a:endParaRPr lang="fr-FR" sz="3600" b="1" cap="small" dirty="0" smtClean="0">
               <a:solidFill>
                 <a:schemeClr val="accent2"/>
               </a:solidFill>

</xml_diff>